<commit_message>
Slides are updated as per the row height issue
</commit_message>
<xml_diff>
--- a/vms_ppt/Test Report 1.pptx
+++ b/vms_ppt/Test Report 1.pptx
@@ -3420,7 +3420,7 @@
         </p:nvGraphicFramePr>
         <p:xfrm>
           <a:off x="457200" y="914400"/>
-          <a:ext cx="10515600" cy="5029200"/>
+          <a:ext cx="10515600" cy="2926080"/>
         </p:xfrm>
         <a:graphic>
           <a:graphicData uri="http://schemas.openxmlformats.org/drawingml/2006/table">
@@ -3434,7 +3434,7 @@
                 <a:gridCol w="1371600"/>
                 <a:gridCol w="1371600"/>
               </a:tblGrid>
-              <a:tr h="558800">
+              <a:tr h="365760">
                 <a:tc>
                   <a:txBody>
                     <a:bodyPr/>
@@ -3528,7 +3528,7 @@
                   </a:tcPr>
                 </a:tc>
               </a:tr>
-              <a:tr h="558800">
+              <a:tr h="320040">
                 <a:tc>
                   <a:txBody>
                     <a:bodyPr/>
@@ -3619,7 +3619,7 @@
                   </a:tcPr>
                 </a:tc>
               </a:tr>
-              <a:tr h="558800">
+              <a:tr h="320040">
                 <a:tc>
                   <a:txBody>
                     <a:bodyPr/>
@@ -3694,7 +3694,7 @@
                   <a:tcPr/>
                 </a:tc>
               </a:tr>
-              <a:tr h="558800">
+              <a:tr h="320040">
                 <a:tc>
                   <a:txBody>
                     <a:bodyPr/>
@@ -3785,7 +3785,7 @@
                   </a:tcPr>
                 </a:tc>
               </a:tr>
-              <a:tr h="558800">
+              <a:tr h="320040">
                 <a:tc>
                   <a:txBody>
                     <a:bodyPr/>
@@ -3857,7 +3857,7 @@
                   <a:tcPr/>
                 </a:tc>
               </a:tr>
-              <a:tr h="558800">
+              <a:tr h="320040">
                 <a:tc>
                   <a:txBody>
                     <a:bodyPr/>
@@ -3945,7 +3945,7 @@
                   </a:tcPr>
                 </a:tc>
               </a:tr>
-              <a:tr h="558800">
+              <a:tr h="320040">
                 <a:tc>
                   <a:txBody>
                     <a:bodyPr/>
@@ -4017,7 +4017,7 @@
                   <a:tcPr/>
                 </a:tc>
               </a:tr>
-              <a:tr h="558800">
+              <a:tr h="320040">
                 <a:tc>
                   <a:txBody>
                     <a:bodyPr/>
@@ -4105,7 +4105,7 @@
                   </a:tcPr>
                 </a:tc>
               </a:tr>
-              <a:tr h="558800">
+              <a:tr h="320040">
                 <a:tc>
                   <a:txBody>
                     <a:bodyPr/>
@@ -4348,7 +4348,7 @@
         </p:nvGraphicFramePr>
         <p:xfrm>
           <a:off x="182880" y="960120"/>
-          <a:ext cx="4389120" cy="914400"/>
+          <a:ext cx="4389120" cy="640080"/>
         </p:xfrm>
         <a:graphic>
           <a:graphicData uri="http://schemas.openxmlformats.org/drawingml/2006/table">
@@ -4360,7 +4360,7 @@
                 <a:gridCol w="3200400"/>
                 <a:gridCol w="1188720"/>
               </a:tblGrid>
-              <a:tr h="457200">
+              <a:tr h="320040">
                 <a:tc>
                   <a:txBody>
                     <a:bodyPr/>
@@ -4408,7 +4408,7 @@
                   </a:tcPr>
                 </a:tc>
               </a:tr>
-              <a:tr h="457200">
+              <a:tr h="320040">
                 <a:tc>
                   <a:txBody>
                     <a:bodyPr/>
@@ -4452,7 +4452,7 @@
         </p:nvSpPr>
         <p:spPr>
           <a:xfrm>
-            <a:off x="182880" y="1920240"/>
+            <a:off x="182880" y="1737360"/>
             <a:ext cx="4389120" cy="182880"/>
           </a:xfrm>
           <a:prstGeom prst="rect">
@@ -4483,7 +4483,7 @@
         </p:nvSpPr>
         <p:spPr>
           <a:xfrm>
-            <a:off x="182880" y="2194560"/>
+            <a:off x="182880" y="2011680"/>
             <a:ext cx="4389120" cy="228600"/>
           </a:xfrm>
           <a:prstGeom prst="rect">
@@ -4521,8 +4521,8 @@
           <p:nvPr/>
         </p:nvGraphicFramePr>
         <p:xfrm>
-          <a:off x="182880" y="2423160"/>
-          <a:ext cx="4389120" cy="1005840"/>
+          <a:off x="182880" y="2240280"/>
+          <a:ext cx="4389120" cy="1280160"/>
         </p:xfrm>
         <a:graphic>
           <a:graphicData uri="http://schemas.openxmlformats.org/drawingml/2006/table">
@@ -4534,7 +4534,7 @@
                 <a:gridCol w="3200400"/>
                 <a:gridCol w="1188720"/>
               </a:tblGrid>
-              <a:tr h="251460">
+              <a:tr h="320040">
                 <a:tc>
                   <a:txBody>
                     <a:bodyPr/>
@@ -4566,7 +4566,7 @@
                   <a:tcPr/>
                 </a:tc>
               </a:tr>
-              <a:tr h="251460">
+              <a:tr h="320040">
                 <a:tc>
                   <a:txBody>
                     <a:bodyPr/>
@@ -4598,7 +4598,7 @@
                   <a:tcPr/>
                 </a:tc>
               </a:tr>
-              <a:tr h="251460">
+              <a:tr h="320040">
                 <a:tc>
                   <a:txBody>
                     <a:bodyPr/>
@@ -4630,7 +4630,7 @@
                   <a:tcPr/>
                 </a:tc>
               </a:tr>
-              <a:tr h="251460">
+              <a:tr h="320040">
                 <a:tc>
                   <a:txBody>
                     <a:bodyPr/>
@@ -4690,7 +4690,7 @@
         </p:nvSpPr>
         <p:spPr>
           <a:xfrm>
-            <a:off x="182880" y="3474720"/>
+            <a:off x="182880" y="3566160"/>
             <a:ext cx="4389120" cy="274320"/>
           </a:xfrm>
           <a:prstGeom prst="rect">
@@ -4723,7 +4723,7 @@
         </p:nvGraphicFramePr>
         <p:xfrm>
           <a:off x="4754880" y="731520"/>
-          <a:ext cx="7315200" cy="1371600"/>
+          <a:ext cx="7315200" cy="1691640"/>
         </p:xfrm>
         <a:graphic>
           <a:graphicData uri="http://schemas.openxmlformats.org/drawingml/2006/table">
@@ -4740,7 +4740,7 @@
                 <a:gridCol w="822960"/>
                 <a:gridCol w="914400"/>
               </a:tblGrid>
-              <a:tr h="228600">
+              <a:tr h="320040">
                 <a:tc>
                   <a:txBody>
                     <a:bodyPr/>
@@ -4903,7 +4903,7 @@
                   </a:tcPr>
                 </a:tc>
               </a:tr>
-              <a:tr h="228600">
+              <a:tr h="274320">
                 <a:tc>
                   <a:txBody>
                     <a:bodyPr/>
@@ -5063,7 +5063,7 @@
                   </a:tcPr>
                 </a:tc>
               </a:tr>
-              <a:tr h="228600">
+              <a:tr h="274320">
                 <a:tc>
                   <a:txBody>
                     <a:bodyPr/>
@@ -5186,7 +5186,7 @@
                   <a:tcPr/>
                 </a:tc>
               </a:tr>
-              <a:tr h="228600">
+              <a:tr h="274320">
                 <a:tc>
                   <a:txBody>
                     <a:bodyPr/>
@@ -5340,7 +5340,7 @@
                   </a:tcPr>
                 </a:tc>
               </a:tr>
-              <a:tr h="228600">
+              <a:tr h="274320">
                 <a:tc>
                   <a:txBody>
                     <a:bodyPr/>
@@ -5466,7 +5466,7 @@
                   <a:tcPr/>
                 </a:tc>
               </a:tr>
-              <a:tr h="228600">
+              <a:tr h="274320">
                 <a:tc>
                   <a:txBody>
                     <a:bodyPr/>
@@ -5635,7 +5635,7 @@
         </p:nvSpPr>
         <p:spPr>
           <a:xfrm>
-            <a:off x="4754880" y="2286000"/>
+            <a:off x="4754880" y="2560320"/>
             <a:ext cx="7253935" cy="914400"/>
           </a:xfrm>
           <a:prstGeom prst="rect">
@@ -5711,8 +5711,8 @@
           <p:nvPr/>
         </p:nvGraphicFramePr>
         <p:xfrm>
-          <a:off x="182880" y="3474720"/>
-          <a:ext cx="11247120" cy="2560320"/>
+          <a:off x="182880" y="3657600"/>
+          <a:ext cx="11247120" cy="1828800"/>
         </p:xfrm>
         <a:graphic>
           <a:graphicData uri="http://schemas.openxmlformats.org/drawingml/2006/table">
@@ -5726,7 +5726,7 @@
                 <a:gridCol w="2011680"/>
                 <a:gridCol w="5943600"/>
               </a:tblGrid>
-              <a:tr h="512064">
+              <a:tr h="365760">
                 <a:tc>
                   <a:txBody>
                     <a:bodyPr/>
@@ -5820,7 +5820,7 @@
                   </a:tcPr>
                 </a:tc>
               </a:tr>
-              <a:tr h="512064">
+              <a:tr h="365760">
                 <a:tc>
                   <a:txBody>
                     <a:bodyPr/>
@@ -5890,7 +5890,7 @@
                   <a:tcPr/>
                 </a:tc>
               </a:tr>
-              <a:tr h="512064">
+              <a:tr h="365760">
                 <a:tc>
                   <a:txBody>
                     <a:bodyPr/>
@@ -5960,7 +5960,7 @@
                   <a:tcPr/>
                 </a:tc>
               </a:tr>
-              <a:tr h="512064">
+              <a:tr h="365760">
                 <a:tc>
                   <a:txBody>
                     <a:bodyPr/>
@@ -6030,7 +6030,7 @@
                   <a:tcPr/>
                 </a:tc>
               </a:tr>
-              <a:tr h="512064">
+              <a:tr h="365760">
                 <a:tc>
                   <a:txBody>
                     <a:bodyPr/>
@@ -6278,7 +6278,7 @@
         </p:nvGraphicFramePr>
         <p:xfrm>
           <a:off x="457200" y="1097280"/>
-          <a:ext cx="11265408" cy="2011680"/>
+          <a:ext cx="11265408" cy="1691640"/>
         </p:xfrm>
         <a:graphic>
           <a:graphicData uri="http://schemas.openxmlformats.org/drawingml/2006/table">
@@ -6293,7 +6293,7 @@
                 <a:gridCol w="1014984"/>
                 <a:gridCol w="1609344"/>
               </a:tblGrid>
-              <a:tr h="335280">
+              <a:tr h="320040">
                 <a:tc>
                   <a:txBody>
                     <a:bodyPr/>
@@ -6410,7 +6410,7 @@
                   </a:tcPr>
                 </a:tc>
               </a:tr>
-              <a:tr h="335280">
+              <a:tr h="274320">
                 <a:tc>
                   <a:txBody>
                     <a:bodyPr/>
@@ -6521,7 +6521,7 @@
                   </a:tcPr>
                 </a:tc>
               </a:tr>
-              <a:tr h="335280">
+              <a:tr h="274320">
                 <a:tc>
                   <a:txBody>
                     <a:bodyPr/>
@@ -6612,7 +6612,7 @@
                   <a:tcPr/>
                 </a:tc>
               </a:tr>
-              <a:tr h="335280">
+              <a:tr h="274320">
                 <a:tc>
                   <a:txBody>
                     <a:bodyPr/>
@@ -6723,7 +6723,7 @@
                   </a:tcPr>
                 </a:tc>
               </a:tr>
-              <a:tr h="335280">
+              <a:tr h="274320">
                 <a:tc>
                   <a:txBody>
                     <a:bodyPr/>
@@ -6814,7 +6814,7 @@
                   <a:tcPr/>
                 </a:tc>
               </a:tr>
-              <a:tr h="335280">
+              <a:tr h="274320">
                 <a:tc>
                   <a:txBody>
                     <a:bodyPr/>
@@ -6937,7 +6937,7 @@
         </p:nvSpPr>
         <p:spPr>
           <a:xfrm>
-            <a:off x="457200" y="3291840"/>
+            <a:off x="457200" y="3108960"/>
             <a:ext cx="11277295" cy="274320"/>
           </a:xfrm>
           <a:prstGeom prst="rect">
@@ -6973,8 +6973,8 @@
           <p:nvPr/>
         </p:nvGraphicFramePr>
         <p:xfrm>
-          <a:off x="457200" y="3657600"/>
-          <a:ext cx="11265408" cy="2194560"/>
+          <a:off x="457200" y="3474720"/>
+          <a:ext cx="11265408" cy="1691640"/>
         </p:xfrm>
         <a:graphic>
           <a:graphicData uri="http://schemas.openxmlformats.org/drawingml/2006/table">
@@ -6989,7 +6989,7 @@
                 <a:gridCol w="1014984"/>
                 <a:gridCol w="1609344"/>
               </a:tblGrid>
-              <a:tr h="365760">
+              <a:tr h="320040">
                 <a:tc>
                   <a:txBody>
                     <a:bodyPr/>
@@ -7106,7 +7106,7 @@
                   </a:tcPr>
                 </a:tc>
               </a:tr>
-              <a:tr h="365760">
+              <a:tr h="274320">
                 <a:tc>
                   <a:txBody>
                     <a:bodyPr/>
@@ -7217,7 +7217,7 @@
                   </a:tcPr>
                 </a:tc>
               </a:tr>
-              <a:tr h="365760">
+              <a:tr h="274320">
                 <a:tc>
                   <a:txBody>
                     <a:bodyPr/>
@@ -7308,7 +7308,7 @@
                   <a:tcPr/>
                 </a:tc>
               </a:tr>
-              <a:tr h="365760">
+              <a:tr h="274320">
                 <a:tc>
                   <a:txBody>
                     <a:bodyPr/>
@@ -7419,7 +7419,7 @@
                   </a:tcPr>
                 </a:tc>
               </a:tr>
-              <a:tr h="365760">
+              <a:tr h="274320">
                 <a:tc>
                   <a:txBody>
                     <a:bodyPr/>
@@ -7510,7 +7510,7 @@
                   <a:tcPr/>
                 </a:tc>
               </a:tr>
-              <a:tr h="365760">
+              <a:tr h="274320">
                 <a:tc>
                   <a:txBody>
                     <a:bodyPr/>
@@ -7634,8 +7634,8 @@
           <p:nvPr/>
         </p:nvGraphicFramePr>
         <p:xfrm>
-          <a:off x="457200" y="6035040"/>
-          <a:ext cx="11274552" cy="731520"/>
+          <a:off x="457200" y="5852160"/>
+          <a:ext cx="11274552" cy="685800"/>
         </p:xfrm>
         <a:graphic>
           <a:graphicData uri="http://schemas.openxmlformats.org/drawingml/2006/table">
@@ -7647,7 +7647,7 @@
                 <a:gridCol w="5637276"/>
                 <a:gridCol w="5637276"/>
               </a:tblGrid>
-              <a:tr h="365760">
+              <a:tr h="320040">
                 <a:tc>
                   <a:txBody>
                     <a:bodyPr/>
@@ -7890,7 +7890,7 @@
         </p:nvGraphicFramePr>
         <p:xfrm>
           <a:off x="457200" y="1097280"/>
-          <a:ext cx="11247120" cy="3474720"/>
+          <a:ext cx="11247120" cy="914400"/>
         </p:xfrm>
         <a:graphic>
           <a:graphicData uri="http://schemas.openxmlformats.org/drawingml/2006/table">
@@ -7906,7 +7906,7 @@
                 <a:gridCol w="1371600"/>
                 <a:gridCol w="2560320"/>
               </a:tblGrid>
-              <a:tr h="1158240">
+              <a:tr h="365760">
                 <a:tc>
                   <a:txBody>
                     <a:bodyPr/>
@@ -8046,7 +8046,7 @@
                   </a:tcPr>
                 </a:tc>
               </a:tr>
-              <a:tr h="1158240">
+              <a:tr h="274320">
                 <a:tc>
                   <a:txBody>
                     <a:bodyPr/>
@@ -8171,7 +8171,7 @@
                   </a:tcPr>
                 </a:tc>
               </a:tr>
-              <a:tr h="1158240">
+              <a:tr h="274320">
                 <a:tc>
                   <a:txBody>
                     <a:bodyPr/>
@@ -8308,7 +8308,7 @@
         </p:nvSpPr>
         <p:spPr>
           <a:xfrm>
-            <a:off x="457200" y="4754880"/>
+            <a:off x="457200" y="2651759"/>
             <a:ext cx="11277295" cy="274320"/>
           </a:xfrm>
           <a:prstGeom prst="rect">
@@ -8344,8 +8344,8 @@
           <p:nvPr/>
         </p:nvGraphicFramePr>
         <p:xfrm>
-          <a:off x="457200" y="5120640"/>
-          <a:ext cx="12161520" cy="2194560"/>
+          <a:off x="457200" y="3017519"/>
+          <a:ext cx="12161520" cy="3383280"/>
         </p:xfrm>
         <a:graphic>
           <a:graphicData uri="http://schemas.openxmlformats.org/drawingml/2006/table">
@@ -8359,7 +8359,7 @@
                 <a:gridCol w="1371600"/>
                 <a:gridCol w="1645920"/>
               </a:tblGrid>
-              <a:tr h="182880">
+              <a:tr h="365760">
                 <a:tc>
                   <a:txBody>
                     <a:bodyPr/>
@@ -8453,7 +8453,7 @@
                   </a:tcPr>
                 </a:tc>
               </a:tr>
-              <a:tr h="182880">
+              <a:tr h="274320">
                 <a:tc>
                   <a:txBody>
                     <a:bodyPr/>
@@ -8544,7 +8544,7 @@
                   </a:tcPr>
                 </a:tc>
               </a:tr>
-              <a:tr h="182880">
+              <a:tr h="274320">
                 <a:tc>
                   <a:txBody>
                     <a:bodyPr/>
@@ -8619,7 +8619,7 @@
                   <a:tcPr/>
                 </a:tc>
               </a:tr>
-              <a:tr h="182880">
+              <a:tr h="274320">
                 <a:tc>
                   <a:txBody>
                     <a:bodyPr/>
@@ -8710,7 +8710,7 @@
                   </a:tcPr>
                 </a:tc>
               </a:tr>
-              <a:tr h="182880">
+              <a:tr h="274320">
                 <a:tc>
                   <a:txBody>
                     <a:bodyPr/>
@@ -8785,7 +8785,7 @@
                   <a:tcPr/>
                 </a:tc>
               </a:tr>
-              <a:tr h="182880">
+              <a:tr h="274320">
                 <a:tc>
                   <a:txBody>
                     <a:bodyPr/>
@@ -8876,7 +8876,7 @@
                   </a:tcPr>
                 </a:tc>
               </a:tr>
-              <a:tr h="182880">
+              <a:tr h="274320">
                 <a:tc>
                   <a:txBody>
                     <a:bodyPr/>
@@ -8951,7 +8951,7 @@
                   <a:tcPr/>
                 </a:tc>
               </a:tr>
-              <a:tr h="182880">
+              <a:tr h="274320">
                 <a:tc>
                   <a:txBody>
                     <a:bodyPr/>
@@ -9039,7 +9039,7 @@
                   </a:tcPr>
                 </a:tc>
               </a:tr>
-              <a:tr h="182880">
+              <a:tr h="274320">
                 <a:tc>
                   <a:txBody>
                     <a:bodyPr/>
@@ -9114,7 +9114,7 @@
                   <a:tcPr/>
                 </a:tc>
               </a:tr>
-              <a:tr h="182880">
+              <a:tr h="274320">
                 <a:tc>
                   <a:txBody>
                     <a:bodyPr/>
@@ -9205,7 +9205,7 @@
                   </a:tcPr>
                 </a:tc>
               </a:tr>
-              <a:tr h="182880">
+              <a:tr h="274320">
                 <a:tc>
                   <a:txBody>
                     <a:bodyPr/>
@@ -9277,7 +9277,7 @@
                   <a:tcPr/>
                 </a:tc>
               </a:tr>
-              <a:tr h="182880">
+              <a:tr h="274320">
                 <a:tc>
                   <a:txBody>
                     <a:bodyPr/>
@@ -9515,7 +9515,7 @@
         </p:nvGraphicFramePr>
         <p:xfrm>
           <a:off x="457200" y="1097280"/>
-          <a:ext cx="11247120" cy="5029200"/>
+          <a:ext cx="11247120" cy="1737360"/>
         </p:xfrm>
         <a:graphic>
           <a:graphicData uri="http://schemas.openxmlformats.org/drawingml/2006/table">
@@ -9530,7 +9530,7 @@
                 <a:gridCol w="1371600"/>
                 <a:gridCol w="1188720"/>
               </a:tblGrid>
-              <a:tr h="838200">
+              <a:tr h="365760">
                 <a:tc>
                   <a:txBody>
                     <a:bodyPr/>
@@ -9647,7 +9647,7 @@
                   </a:tcPr>
                 </a:tc>
               </a:tr>
-              <a:tr h="838200">
+              <a:tr h="274320">
                 <a:tc>
                   <a:txBody>
                     <a:bodyPr/>
@@ -9764,7 +9764,7 @@
                   </a:tcPr>
                 </a:tc>
               </a:tr>
-              <a:tr h="838200">
+              <a:tr h="274320">
                 <a:tc>
                   <a:txBody>
                     <a:bodyPr/>
@@ -9861,7 +9861,7 @@
                   <a:tcPr/>
                 </a:tc>
               </a:tr>
-              <a:tr h="838200">
+              <a:tr h="274320">
                 <a:tc>
                   <a:txBody>
                     <a:bodyPr/>
@@ -9978,7 +9978,7 @@
                   </a:tcPr>
                 </a:tc>
               </a:tr>
-              <a:tr h="838200">
+              <a:tr h="274320">
                 <a:tc>
                   <a:txBody>
                     <a:bodyPr/>
@@ -10075,7 +10075,7 @@
                   <a:tcPr/>
                 </a:tc>
               </a:tr>
-              <a:tr h="838200">
+              <a:tr h="274320">
                 <a:tc>
                   <a:txBody>
                     <a:bodyPr/>
@@ -10339,7 +10339,7 @@
         </p:nvGraphicFramePr>
         <p:xfrm>
           <a:off x="457200" y="1097280"/>
-          <a:ext cx="10332720" cy="1828800"/>
+          <a:ext cx="10332720" cy="1965960"/>
         </p:xfrm>
         <a:graphic>
           <a:graphicData uri="http://schemas.openxmlformats.org/drawingml/2006/table">
@@ -10355,7 +10355,7 @@
                 <a:gridCol w="1371600"/>
                 <a:gridCol w="1645920"/>
               </a:tblGrid>
-              <a:tr h="304800">
+              <a:tr h="365760">
                 <a:tc>
                   <a:txBody>
                     <a:bodyPr/>
@@ -10495,7 +10495,7 @@
                   </a:tcPr>
                 </a:tc>
               </a:tr>
-              <a:tr h="304800">
+              <a:tr h="320040">
                 <a:tc>
                   <a:txBody>
                     <a:bodyPr/>
@@ -10635,7 +10635,7 @@
                   </a:tcPr>
                 </a:tc>
               </a:tr>
-              <a:tr h="304800">
+              <a:tr h="320040">
                 <a:tc>
                   <a:txBody>
                     <a:bodyPr/>
@@ -10751,7 +10751,7 @@
                   <a:tcPr/>
                 </a:tc>
               </a:tr>
-              <a:tr h="304800">
+              <a:tr h="320040">
                 <a:tc>
                   <a:txBody>
                     <a:bodyPr/>
@@ -10891,7 +10891,7 @@
                   </a:tcPr>
                 </a:tc>
               </a:tr>
-              <a:tr h="304800">
+              <a:tr h="320040">
                 <a:tc>
                   <a:txBody>
                     <a:bodyPr/>
@@ -11007,7 +11007,7 @@
                   <a:tcPr/>
                 </a:tc>
               </a:tr>
-              <a:tr h="304800">
+              <a:tr h="320040">
                 <a:tc>
                   <a:txBody>
                     <a:bodyPr/>
@@ -11153,7 +11153,7 @@
         </p:nvSpPr>
         <p:spPr>
           <a:xfrm>
-            <a:off x="457200" y="3017520"/>
+            <a:off x="457200" y="3474719"/>
             <a:ext cx="11277295" cy="182880"/>
           </a:xfrm>
           <a:prstGeom prst="rect">
@@ -11188,7 +11188,7 @@
         </p:nvSpPr>
         <p:spPr>
           <a:xfrm>
-            <a:off x="457200" y="3474720"/>
+            <a:off x="457200" y="3749039"/>
             <a:ext cx="11277295" cy="274320"/>
           </a:xfrm>
           <a:prstGeom prst="rect">
@@ -11224,8 +11224,8 @@
           <p:nvPr/>
         </p:nvGraphicFramePr>
         <p:xfrm>
-          <a:off x="457200" y="3840480"/>
-          <a:ext cx="10332720" cy="1828800"/>
+          <a:off x="457200" y="4114799"/>
+          <a:ext cx="10332720" cy="1965960"/>
         </p:xfrm>
         <a:graphic>
           <a:graphicData uri="http://schemas.openxmlformats.org/drawingml/2006/table">
@@ -11241,7 +11241,7 @@
                 <a:gridCol w="1371600"/>
                 <a:gridCol w="1645920"/>
               </a:tblGrid>
-              <a:tr h="304800">
+              <a:tr h="365760">
                 <a:tc>
                   <a:txBody>
                     <a:bodyPr/>
@@ -11381,7 +11381,7 @@
                   </a:tcPr>
                 </a:tc>
               </a:tr>
-              <a:tr h="304800">
+              <a:tr h="320040">
                 <a:tc>
                   <a:txBody>
                     <a:bodyPr/>
@@ -11521,7 +11521,7 @@
                   </a:tcPr>
                 </a:tc>
               </a:tr>
-              <a:tr h="304800">
+              <a:tr h="320040">
                 <a:tc>
                   <a:txBody>
                     <a:bodyPr/>
@@ -11637,7 +11637,7 @@
                   <a:tcPr/>
                 </a:tc>
               </a:tr>
-              <a:tr h="304800">
+              <a:tr h="320040">
                 <a:tc>
                   <a:txBody>
                     <a:bodyPr/>
@@ -11777,7 +11777,7 @@
                   </a:tcPr>
                 </a:tc>
               </a:tr>
-              <a:tr h="304800">
+              <a:tr h="320040">
                 <a:tc>
                   <a:txBody>
                     <a:bodyPr/>
@@ -11893,7 +11893,7 @@
                   <a:tcPr/>
                 </a:tc>
               </a:tr>
-              <a:tr h="304800">
+              <a:tr h="320040">
                 <a:tc>
                   <a:txBody>
                     <a:bodyPr/>
@@ -12139,7 +12139,7 @@
         </p:nvGraphicFramePr>
         <p:xfrm>
           <a:off x="457200" y="914400"/>
-          <a:ext cx="11265408" cy="5029200"/>
+          <a:ext cx="11265408" cy="2834640"/>
         </p:xfrm>
         <a:graphic>
           <a:graphicData uri="http://schemas.openxmlformats.org/drawingml/2006/table">
@@ -12155,7 +12155,7 @@
                 <a:gridCol w="1124712"/>
                 <a:gridCol w="1408176"/>
               </a:tblGrid>
-              <a:tr h="502920">
+              <a:tr h="365760">
                 <a:tc>
                   <a:txBody>
                     <a:bodyPr/>
@@ -12295,7 +12295,7 @@
                   </a:tcPr>
                 </a:tc>
               </a:tr>
-              <a:tr h="502920">
+              <a:tr h="274320">
                 <a:tc>
                   <a:txBody>
                     <a:bodyPr/>
@@ -12426,7 +12426,7 @@
                   </a:tcPr>
                 </a:tc>
               </a:tr>
-              <a:tr h="502920">
+              <a:tr h="274320">
                 <a:tc>
                   <a:txBody>
                     <a:bodyPr/>
@@ -12533,7 +12533,7 @@
                   <a:tcPr/>
                 </a:tc>
               </a:tr>
-              <a:tr h="502920">
+              <a:tr h="274320">
                 <a:tc>
                   <a:txBody>
                     <a:bodyPr/>
@@ -12664,7 +12664,7 @@
                   </a:tcPr>
                 </a:tc>
               </a:tr>
-              <a:tr h="502920">
+              <a:tr h="274320">
                 <a:tc>
                   <a:txBody>
                     <a:bodyPr/>
@@ -12771,7 +12771,7 @@
                   <a:tcPr/>
                 </a:tc>
               </a:tr>
-              <a:tr h="502920">
+              <a:tr h="274320">
                 <a:tc>
                   <a:txBody>
                     <a:bodyPr/>
@@ -12902,7 +12902,7 @@
                   </a:tcPr>
                 </a:tc>
               </a:tr>
-              <a:tr h="502920">
+              <a:tr h="274320">
                 <a:tc>
                   <a:txBody>
                     <a:bodyPr/>
@@ -13009,7 +13009,7 @@
                   <a:tcPr/>
                 </a:tc>
               </a:tr>
-              <a:tr h="502920">
+              <a:tr h="274320">
                 <a:tc>
                   <a:txBody>
                     <a:bodyPr/>
@@ -13140,7 +13140,7 @@
                   </a:tcPr>
                 </a:tc>
               </a:tr>
-              <a:tr h="502920">
+              <a:tr h="274320">
                 <a:tc>
                   <a:txBody>
                     <a:bodyPr/>
@@ -13247,7 +13247,7 @@
                   <a:tcPr/>
                 </a:tc>
               </a:tr>
-              <a:tr h="502920">
+              <a:tr h="274320">
                 <a:tc>
                   <a:txBody>
                     <a:bodyPr/>
@@ -13499,7 +13499,7 @@
         </p:nvGraphicFramePr>
         <p:xfrm>
           <a:off x="274320" y="914400"/>
-          <a:ext cx="10515600" cy="5029200"/>
+          <a:ext cx="10515600" cy="4754880"/>
         </p:xfrm>
         <a:graphic>
           <a:graphicData uri="http://schemas.openxmlformats.org/drawingml/2006/table">
@@ -13515,7 +13515,7 @@
                 <a:gridCol w="1371600"/>
                 <a:gridCol w="1828800"/>
               </a:tblGrid>
-              <a:tr h="295835">
+              <a:tr h="365760">
                 <a:tc>
                   <a:txBody>
                     <a:bodyPr/>
@@ -13655,7 +13655,7 @@
                   </a:tcPr>
                 </a:tc>
               </a:tr>
-              <a:tr h="295835">
+              <a:tr h="274320">
                 <a:tc>
                   <a:txBody>
                     <a:bodyPr/>
@@ -13786,7 +13786,7 @@
                   </a:tcPr>
                 </a:tc>
               </a:tr>
-              <a:tr h="295835">
+              <a:tr h="274320">
                 <a:tc>
                   <a:txBody>
                     <a:bodyPr/>
@@ -13893,7 +13893,7 @@
                   <a:tcPr/>
                 </a:tc>
               </a:tr>
-              <a:tr h="295835">
+              <a:tr h="274320">
                 <a:tc>
                   <a:txBody>
                     <a:bodyPr/>
@@ -14024,7 +14024,7 @@
                   </a:tcPr>
                 </a:tc>
               </a:tr>
-              <a:tr h="295835">
+              <a:tr h="274320">
                 <a:tc>
                   <a:txBody>
                     <a:bodyPr/>
@@ -14131,7 +14131,7 @@
                   <a:tcPr/>
                 </a:tc>
               </a:tr>
-              <a:tr h="295835">
+              <a:tr h="274320">
                 <a:tc>
                   <a:txBody>
                     <a:bodyPr/>
@@ -14262,7 +14262,7 @@
                   </a:tcPr>
                 </a:tc>
               </a:tr>
-              <a:tr h="295835">
+              <a:tr h="274320">
                 <a:tc>
                   <a:txBody>
                     <a:bodyPr/>
@@ -14369,7 +14369,7 @@
                   <a:tcPr/>
                 </a:tc>
               </a:tr>
-              <a:tr h="295835">
+              <a:tr h="274320">
                 <a:tc>
                   <a:txBody>
                     <a:bodyPr/>
@@ -14500,7 +14500,7 @@
                   </a:tcPr>
                 </a:tc>
               </a:tr>
-              <a:tr h="295835">
+              <a:tr h="274320">
                 <a:tc>
                   <a:txBody>
                     <a:bodyPr/>
@@ -14607,7 +14607,7 @@
                   <a:tcPr/>
                 </a:tc>
               </a:tr>
-              <a:tr h="295835">
+              <a:tr h="274320">
                 <a:tc>
                   <a:txBody>
                     <a:bodyPr/>
@@ -14738,7 +14738,7 @@
                   </a:tcPr>
                 </a:tc>
               </a:tr>
-              <a:tr h="295835">
+              <a:tr h="274320">
                 <a:tc>
                   <a:txBody>
                     <a:bodyPr/>
@@ -14845,7 +14845,7 @@
                   <a:tcPr/>
                 </a:tc>
               </a:tr>
-              <a:tr h="295835">
+              <a:tr h="274320">
                 <a:tc>
                   <a:txBody>
                     <a:bodyPr/>
@@ -14976,7 +14976,7 @@
                   </a:tcPr>
                 </a:tc>
               </a:tr>
-              <a:tr h="295835">
+              <a:tr h="274320">
                 <a:tc>
                   <a:txBody>
                     <a:bodyPr/>
@@ -15083,7 +15083,7 @@
                   <a:tcPr/>
                 </a:tc>
               </a:tr>
-              <a:tr h="295835">
+              <a:tr h="274320">
                 <a:tc>
                   <a:txBody>
                     <a:bodyPr/>
@@ -15214,7 +15214,7 @@
                   </a:tcPr>
                 </a:tc>
               </a:tr>
-              <a:tr h="295835">
+              <a:tr h="274320">
                 <a:tc>
                   <a:txBody>
                     <a:bodyPr/>
@@ -15321,7 +15321,7 @@
                   <a:tcPr/>
                 </a:tc>
               </a:tr>
-              <a:tr h="295835">
+              <a:tr h="274320">
                 <a:tc>
                   <a:txBody>
                     <a:bodyPr/>
@@ -15452,7 +15452,7 @@
                   </a:tcPr>
                 </a:tc>
               </a:tr>
-              <a:tr h="295840">
+              <a:tr h="274320">
                 <a:tc>
                   <a:txBody>
                     <a:bodyPr/>
@@ -15704,7 +15704,7 @@
         </p:nvGraphicFramePr>
         <p:xfrm>
           <a:off x="274320" y="914400"/>
-          <a:ext cx="4572000" cy="4114800"/>
+          <a:ext cx="4572000" cy="1965960"/>
         </p:xfrm>
         <a:graphic>
           <a:graphicData uri="http://schemas.openxmlformats.org/drawingml/2006/table">
@@ -15716,7 +15716,7 @@
                 <a:gridCol w="3200400"/>
                 <a:gridCol w="1371600"/>
               </a:tblGrid>
-              <a:tr h="685800">
+              <a:tr h="365760">
                 <a:tc>
                   <a:txBody>
                     <a:bodyPr/>
@@ -15764,7 +15764,7 @@
                   </a:tcPr>
                 </a:tc>
               </a:tr>
-              <a:tr h="685800">
+              <a:tr h="320040">
                 <a:tc>
                   <a:txBody>
                     <a:bodyPr/>
@@ -15812,7 +15812,7 @@
                   </a:tcPr>
                 </a:tc>
               </a:tr>
-              <a:tr h="685800">
+              <a:tr h="320040">
                 <a:tc>
                   <a:txBody>
                     <a:bodyPr/>
@@ -15852,7 +15852,7 @@
                   <a:tcPr/>
                 </a:tc>
               </a:tr>
-              <a:tr h="685800">
+              <a:tr h="320040">
                 <a:tc>
                   <a:txBody>
                     <a:bodyPr/>
@@ -15900,7 +15900,7 @@
                   </a:tcPr>
                 </a:tc>
               </a:tr>
-              <a:tr h="685800">
+              <a:tr h="320040">
                 <a:tc>
                   <a:txBody>
                     <a:bodyPr/>
@@ -15940,7 +15940,7 @@
                   <a:tcPr/>
                 </a:tc>
               </a:tr>
-              <a:tr h="685800">
+              <a:tr h="320040">
                 <a:tc>
                   <a:txBody>
                     <a:bodyPr/>
@@ -16002,7 +16002,7 @@
         </p:nvGraphicFramePr>
         <p:xfrm>
           <a:off x="6370167" y="914400"/>
-          <a:ext cx="4572000" cy="4114800"/>
+          <a:ext cx="4572000" cy="1005840"/>
         </p:xfrm>
         <a:graphic>
           <a:graphicData uri="http://schemas.openxmlformats.org/drawingml/2006/table">
@@ -16014,7 +16014,7 @@
                 <a:gridCol w="3200400"/>
                 <a:gridCol w="1371600"/>
               </a:tblGrid>
-              <a:tr h="1371600">
+              <a:tr h="365760">
                 <a:tc>
                   <a:txBody>
                     <a:bodyPr/>
@@ -16062,7 +16062,7 @@
                   </a:tcPr>
                 </a:tc>
               </a:tr>
-              <a:tr h="1371600">
+              <a:tr h="320040">
                 <a:tc>
                   <a:txBody>
                     <a:bodyPr/>
@@ -16110,7 +16110,7 @@
                   </a:tcPr>
                 </a:tc>
               </a:tr>
-              <a:tr h="1371600">
+              <a:tr h="320040">
                 <a:tc>
                   <a:txBody>
                     <a:bodyPr/>
@@ -16171,8 +16171,8 @@
           <p:nvPr/>
         </p:nvGraphicFramePr>
         <p:xfrm>
-          <a:off x="274320" y="5303520"/>
-          <a:ext cx="4572000" cy="1097280"/>
+          <a:off x="274320" y="3474719"/>
+          <a:ext cx="4572000" cy="1325880"/>
         </p:xfrm>
         <a:graphic>
           <a:graphicData uri="http://schemas.openxmlformats.org/drawingml/2006/table">
@@ -16184,7 +16184,7 @@
                 <a:gridCol w="3200400"/>
                 <a:gridCol w="1371600"/>
               </a:tblGrid>
-              <a:tr h="274320">
+              <a:tr h="365760">
                 <a:tc>
                   <a:txBody>
                     <a:bodyPr/>
@@ -16244,7 +16244,7 @@
                   </a:tcPr>
                 </a:tc>
               </a:tr>
-              <a:tr h="274320">
+              <a:tr h="320040">
                 <a:tc>
                   <a:txBody>
                     <a:bodyPr/>
@@ -16304,7 +16304,7 @@
                   </a:tcPr>
                 </a:tc>
               </a:tr>
-              <a:tr h="274320">
+              <a:tr h="320040">
                 <a:tc>
                   <a:txBody>
                     <a:bodyPr/>
@@ -16364,7 +16364,7 @@
                   </a:tcPr>
                 </a:tc>
               </a:tr>
-              <a:tr h="274320">
+              <a:tr h="320040">
                 <a:tc>
                   <a:txBody>
                     <a:bodyPr/>

</xml_diff>

<commit_message>
Updated testing report 1 with llm
</commit_message>
<xml_diff>
--- a/vms_ppt/Test Report 1.pptx
+++ b/vms_ppt/Test Report 1.pptx
@@ -5636,7 +5636,7 @@
         <p:spPr>
           <a:xfrm>
             <a:off x="4754880" y="2560320"/>
-            <a:ext cx="7253935" cy="914400"/>
+            <a:ext cx="7253935" cy="731520"/>
           </a:xfrm>
           <a:prstGeom prst="rect">
             <a:avLst/>
@@ -5711,8 +5711,8 @@
           <p:nvPr/>
         </p:nvGraphicFramePr>
         <p:xfrm>
-          <a:off x="182880" y="3657600"/>
-          <a:ext cx="11247120" cy="1828800"/>
+          <a:off x="182880" y="3886200"/>
+          <a:ext cx="11247120" cy="1490472"/>
         </p:xfrm>
         <a:graphic>
           <a:graphicData uri="http://schemas.openxmlformats.org/drawingml/2006/table">
@@ -5726,7 +5726,7 @@
                 <a:gridCol w="2011680"/>
                 <a:gridCol w="5943600"/>
               </a:tblGrid>
-              <a:tr h="365760">
+              <a:tr h="320040">
                 <a:tc>
                   <a:txBody>
                     <a:bodyPr/>
@@ -5820,7 +5820,7 @@
                   </a:tcPr>
                 </a:tc>
               </a:tr>
-              <a:tr h="365760">
+              <a:tr h="292608">
                 <a:tc>
                   <a:txBody>
                     <a:bodyPr/>
@@ -5890,7 +5890,7 @@
                   <a:tcPr/>
                 </a:tc>
               </a:tr>
-              <a:tr h="365760">
+              <a:tr h="292608">
                 <a:tc>
                   <a:txBody>
                     <a:bodyPr/>
@@ -5960,7 +5960,7 @@
                   <a:tcPr/>
                 </a:tc>
               </a:tr>
-              <a:tr h="365760">
+              <a:tr h="292608">
                 <a:tc>
                   <a:txBody>
                     <a:bodyPr/>
@@ -6030,7 +6030,7 @@
                   <a:tcPr/>
                 </a:tc>
               </a:tr>
-              <a:tr h="365760">
+              <a:tr h="292608">
                 <a:tc>
                   <a:txBody>
                     <a:bodyPr/>
@@ -6112,7 +6112,7 @@
         </p:nvSpPr>
         <p:spPr>
           <a:xfrm>
-            <a:off x="182880" y="6217920"/>
+            <a:off x="182880" y="5394960"/>
             <a:ext cx="11825935" cy="274320"/>
           </a:xfrm>
           <a:prstGeom prst="rect">
@@ -6256,7 +6256,7 @@
           <a:lstStyle/>
           <a:p>
             <a:pPr algn="l">
-              <a:defRPr b="1" sz="1400">
+              <a:defRPr b="1" sz="1600">
                 <a:solidFill>
                   <a:srgbClr val="000000"/>
                 </a:solidFill>
@@ -6821,7 +6821,7 @@
                     <a:lstStyle/>
                     <a:p>
                       <a:pPr>
-                        <a:defRPr sz="900" b="1">
+                        <a:defRPr b="1" sz="1000">
                           <a:solidFill>
                             <a:srgbClr val="FFFFFF"/>
                           </a:solidFill>
@@ -6844,7 +6844,7 @@
                     <a:lstStyle/>
                     <a:p>
                       <a:pPr algn="l">
-                        <a:defRPr sz="900" b="1">
+                        <a:defRPr b="1" sz="1000">
                           <a:solidFill>
                             <a:srgbClr val="FFFFFF"/>
                           </a:solidFill>
@@ -6867,7 +6867,7 @@
                     <a:lstStyle/>
                     <a:p>
                       <a:pPr algn="l">
-                        <a:defRPr sz="900" b="1">
+                        <a:defRPr b="1" sz="1000">
                           <a:solidFill>
                             <a:srgbClr val="FFFFFF"/>
                           </a:solidFill>
@@ -6887,7 +6887,7 @@
                     <a:lstStyle/>
                     <a:p>
                       <a:pPr algn="l">
-                        <a:defRPr sz="900" b="1">
+                        <a:defRPr b="1" sz="1000">
                           <a:solidFill>
                             <a:srgbClr val="FFFFFF"/>
                           </a:solidFill>
@@ -6907,7 +6907,7 @@
                     <a:lstStyle/>
                     <a:p>
                       <a:pPr algn="l">
-                        <a:defRPr sz="900" b="1">
+                        <a:defRPr b="1" sz="1000">
                           <a:solidFill>
                             <a:srgbClr val="FFFFFF"/>
                           </a:solidFill>
@@ -6952,7 +6952,7 @@
           <a:lstStyle/>
           <a:p>
             <a:pPr algn="l">
-              <a:defRPr b="1" sz="1400">
+              <a:defRPr b="1" sz="1600">
                 <a:solidFill>
                   <a:srgbClr val="000000"/>
                 </a:solidFill>
@@ -7517,7 +7517,7 @@
                     <a:lstStyle/>
                     <a:p>
                       <a:pPr>
-                        <a:defRPr sz="900" b="1">
+                        <a:defRPr b="1" sz="1000">
                           <a:solidFill>
                             <a:srgbClr val="FFFFFF"/>
                           </a:solidFill>
@@ -7540,7 +7540,7 @@
                     <a:lstStyle/>
                     <a:p>
                       <a:pPr algn="l">
-                        <a:defRPr sz="900" b="1">
+                        <a:defRPr b="1" sz="1000">
                           <a:solidFill>
                             <a:srgbClr val="FFFFFF"/>
                           </a:solidFill>
@@ -7560,7 +7560,7 @@
                     <a:lstStyle/>
                     <a:p>
                       <a:pPr algn="l">
-                        <a:defRPr sz="900" b="1">
+                        <a:defRPr b="1" sz="1000">
                           <a:solidFill>
                             <a:srgbClr val="FFFFFF"/>
                           </a:solidFill>
@@ -7583,7 +7583,7 @@
                     <a:lstStyle/>
                     <a:p>
                       <a:pPr algn="l">
-                        <a:defRPr sz="900" b="1">
+                        <a:defRPr b="1" sz="1000">
                           <a:solidFill>
                             <a:srgbClr val="FFFFFF"/>
                           </a:solidFill>
@@ -7603,7 +7603,7 @@
                     <a:lstStyle/>
                     <a:p>
                       <a:pPr algn="l">
-                        <a:defRPr sz="900" b="1">
+                        <a:defRPr b="1" sz="1000">
                           <a:solidFill>
                             <a:srgbClr val="FFFFFF"/>
                           </a:solidFill>
@@ -7724,7 +7724,7 @@
                     <a:bodyPr/>
                     <a:lstStyle/>
                     <a:p>
-                      <a:pPr>
+                      <a:pPr algn="l">
                         <a:defRPr sz="900">
                           <a:solidFill>
                             <a:srgbClr val="000000"/>
@@ -7868,7 +7868,7 @@
           <a:lstStyle/>
           <a:p>
             <a:pPr algn="l">
-              <a:defRPr b="1" sz="1400">
+              <a:defRPr b="1" sz="1600">
                 <a:solidFill>
                   <a:srgbClr val="000000"/>
                 </a:solidFill>
@@ -8178,7 +8178,7 @@
                     <a:lstStyle/>
                     <a:p>
                       <a:pPr>
-                        <a:defRPr sz="900" b="1">
+                        <a:defRPr b="1" sz="1000">
                           <a:solidFill>
                             <a:srgbClr val="FFFFFF"/>
                           </a:solidFill>
@@ -8201,7 +8201,7 @@
                     <a:lstStyle/>
                     <a:p>
                       <a:pPr algn="l">
-                        <a:defRPr sz="900" b="1">
+                        <a:defRPr b="1" sz="1000">
                           <a:solidFill>
                             <a:srgbClr val="FFFFFF"/>
                           </a:solidFill>
@@ -8221,7 +8221,7 @@
                     <a:lstStyle/>
                     <a:p>
                       <a:pPr algn="l">
-                        <a:defRPr sz="900" b="1">
+                        <a:defRPr b="1" sz="1000">
                           <a:solidFill>
                             <a:srgbClr val="FFFFFF"/>
                           </a:solidFill>
@@ -8241,7 +8241,7 @@
                     <a:lstStyle/>
                     <a:p>
                       <a:pPr algn="l">
-                        <a:defRPr sz="900" b="1">
+                        <a:defRPr b="1" sz="1000">
                           <a:solidFill>
                             <a:srgbClr val="FFFFFF"/>
                           </a:solidFill>
@@ -8261,7 +8261,7 @@
                     <a:lstStyle/>
                     <a:p>
                       <a:pPr algn="l">
-                        <a:defRPr sz="900" b="1">
+                        <a:defRPr b="1" sz="1000">
                           <a:solidFill>
                             <a:srgbClr val="FFFFFF"/>
                           </a:solidFill>
@@ -8281,7 +8281,7 @@
                     <a:lstStyle/>
                     <a:p>
                       <a:pPr algn="l">
-                        <a:defRPr sz="900" b="1">
+                        <a:defRPr b="1" sz="1000">
                           <a:solidFill>
                             <a:srgbClr val="FFFFFF"/>
                           </a:solidFill>
@@ -8308,7 +8308,7 @@
         </p:nvSpPr>
         <p:spPr>
           <a:xfrm>
-            <a:off x="457200" y="2651759"/>
+            <a:off x="457200" y="3840480"/>
             <a:ext cx="11277295" cy="274320"/>
           </a:xfrm>
           <a:prstGeom prst="rect">
@@ -8323,7 +8323,7 @@
           <a:lstStyle/>
           <a:p>
             <a:pPr algn="l">
-              <a:defRPr b="1" sz="1400">
+              <a:defRPr b="1" sz="1600">
                 <a:solidFill>
                   <a:srgbClr val="000000"/>
                 </a:solidFill>
@@ -8344,7 +8344,7 @@
           <p:nvPr/>
         </p:nvGraphicFramePr>
         <p:xfrm>
-          <a:off x="457200" y="3017519"/>
+          <a:off x="457200" y="4206240"/>
           <a:ext cx="12161520" cy="3383280"/>
         </p:xfrm>
         <a:graphic>
@@ -9284,7 +9284,7 @@
                     <a:lstStyle/>
                     <a:p>
                       <a:pPr>
-                        <a:defRPr sz="900" b="1">
+                        <a:defRPr b="1" sz="1000">
                           <a:solidFill>
                             <a:srgbClr val="FFFFFF"/>
                           </a:solidFill>
@@ -9307,7 +9307,7 @@
                     <a:lstStyle/>
                     <a:p>
                       <a:pPr algn="l">
-                        <a:defRPr sz="900" b="1">
+                        <a:defRPr b="1" sz="1000">
                           <a:solidFill>
                             <a:srgbClr val="FFFFFF"/>
                           </a:solidFill>
@@ -9327,7 +9327,7 @@
                     <a:lstStyle/>
                     <a:p>
                       <a:pPr algn="l">
-                        <a:defRPr sz="900" b="1">
+                        <a:defRPr b="1" sz="1000">
                           <a:solidFill>
                             <a:srgbClr val="FFFFFF"/>
                           </a:solidFill>
@@ -9350,7 +9350,7 @@
                     <a:lstStyle/>
                     <a:p>
                       <a:pPr algn="l">
-                        <a:defRPr sz="900" b="1">
+                        <a:defRPr b="1" sz="1000">
                           <a:solidFill>
                             <a:srgbClr val="FFFFFF"/>
                           </a:solidFill>
@@ -10501,7 +10501,7 @@
                     <a:bodyPr/>
                     <a:lstStyle/>
                     <a:p>
-                      <a:pPr algn="l">
+                      <a:pPr>
                         <a:defRPr sz="900">
                           <a:solidFill>
                             <a:srgbClr val="000000"/>
@@ -10524,7 +10524,7 @@
                     <a:bodyPr/>
                     <a:lstStyle/>
                     <a:p>
-                      <a:pPr>
+                      <a:pPr algn="l">
                         <a:defRPr sz="900">
                           <a:solidFill>
                             <a:srgbClr val="000000"/>
@@ -10641,7 +10641,7 @@
                     <a:bodyPr/>
                     <a:lstStyle/>
                     <a:p>
-                      <a:pPr algn="l">
+                      <a:pPr>
                         <a:defRPr sz="900">
                           <a:solidFill>
                             <a:srgbClr val="000000"/>
@@ -10660,7 +10660,7 @@
                     <a:bodyPr/>
                     <a:lstStyle/>
                     <a:p>
-                      <a:pPr>
+                      <a:pPr algn="l">
                         <a:defRPr sz="900">
                           <a:solidFill>
                             <a:srgbClr val="000000"/>
@@ -10757,7 +10757,7 @@
                     <a:bodyPr/>
                     <a:lstStyle/>
                     <a:p>
-                      <a:pPr algn="l">
+                      <a:pPr>
                         <a:defRPr sz="900">
                           <a:solidFill>
                             <a:srgbClr val="000000"/>
@@ -10780,7 +10780,7 @@
                     <a:bodyPr/>
                     <a:lstStyle/>
                     <a:p>
-                      <a:pPr>
+                      <a:pPr algn="l">
                         <a:defRPr sz="900">
                           <a:solidFill>
                             <a:srgbClr val="000000"/>
@@ -10897,7 +10897,7 @@
                     <a:bodyPr/>
                     <a:lstStyle/>
                     <a:p>
-                      <a:pPr algn="l">
+                      <a:pPr>
                         <a:defRPr sz="900">
                           <a:solidFill>
                             <a:srgbClr val="000000"/>
@@ -10916,7 +10916,7 @@
                     <a:bodyPr/>
                     <a:lstStyle/>
                     <a:p>
-                      <a:pPr>
+                      <a:pPr algn="l">
                         <a:defRPr sz="900">
                           <a:solidFill>
                             <a:srgbClr val="000000"/>
@@ -11013,30 +11013,30 @@
                     <a:bodyPr/>
                     <a:lstStyle/>
                     <a:p>
-                      <a:pPr algn="l">
-                        <a:defRPr sz="900" b="1">
-                          <a:solidFill>
-                            <a:srgbClr val="FFFFFF"/>
-                          </a:solidFill>
-                        </a:defRPr>
-                      </a:pPr>
-                    </a:p>
-                  </a:txBody>
-                  <a:tcPr>
-                    <a:solidFill>
-                      <a:srgbClr val="4472C4"/>
-                    </a:solidFill>
-                  </a:tcPr>
-                </a:tc>
-                <a:tc>
-                  <a:txBody>
-                    <a:bodyPr/>
-                    <a:lstStyle/>
-                    <a:p>
                       <a:pPr>
-                        <a:defRPr sz="900" b="1">
-                          <a:solidFill>
-                            <a:srgbClr val="FFFFFF"/>
+                        <a:defRPr sz="900">
+                          <a:solidFill>
+                            <a:srgbClr val="000000"/>
+                          </a:solidFill>
+                        </a:defRPr>
+                      </a:pPr>
+                    </a:p>
+                  </a:txBody>
+                  <a:tcPr>
+                    <a:solidFill>
+                      <a:srgbClr val="F5F5F5"/>
+                    </a:solidFill>
+                  </a:tcPr>
+                </a:tc>
+                <a:tc>
+                  <a:txBody>
+                    <a:bodyPr/>
+                    <a:lstStyle/>
+                    <a:p>
+                      <a:pPr algn="l">
+                        <a:defRPr sz="900">
+                          <a:solidFill>
+                            <a:srgbClr val="000000"/>
                           </a:solidFill>
                         </a:defRPr>
                       </a:pPr>
@@ -11047,19 +11047,19 @@
                   </a:txBody>
                   <a:tcPr>
                     <a:solidFill>
-                      <a:srgbClr val="4472C4"/>
-                    </a:solidFill>
-                  </a:tcPr>
-                </a:tc>
-                <a:tc>
-                  <a:txBody>
-                    <a:bodyPr/>
-                    <a:lstStyle/>
-                    <a:p>
-                      <a:pPr algn="l">
-                        <a:defRPr sz="900" b="1">
-                          <a:solidFill>
-                            <a:srgbClr val="FFFFFF"/>
+                      <a:srgbClr val="F5F5F5"/>
+                    </a:solidFill>
+                  </a:tcPr>
+                </a:tc>
+                <a:tc>
+                  <a:txBody>
+                    <a:bodyPr/>
+                    <a:lstStyle/>
+                    <a:p>
+                      <a:pPr algn="l">
+                        <a:defRPr sz="900">
+                          <a:solidFill>
+                            <a:srgbClr val="000000"/>
                           </a:solidFill>
                         </a:defRPr>
                       </a:pPr>
@@ -11070,19 +11070,19 @@
                   </a:txBody>
                   <a:tcPr>
                     <a:solidFill>
-                      <a:srgbClr val="4472C4"/>
-                    </a:solidFill>
-                  </a:tcPr>
-                </a:tc>
-                <a:tc>
-                  <a:txBody>
-                    <a:bodyPr/>
-                    <a:lstStyle/>
-                    <a:p>
-                      <a:pPr algn="l">
-                        <a:defRPr sz="900" b="1">
-                          <a:solidFill>
-                            <a:srgbClr val="FFFFFF"/>
+                      <a:srgbClr val="F5F5F5"/>
+                    </a:solidFill>
+                  </a:tcPr>
+                </a:tc>
+                <a:tc>
+                  <a:txBody>
+                    <a:bodyPr/>
+                    <a:lstStyle/>
+                    <a:p>
+                      <a:pPr algn="l">
+                        <a:defRPr sz="900">
+                          <a:solidFill>
+                            <a:srgbClr val="000000"/>
                           </a:solidFill>
                         </a:defRPr>
                       </a:pPr>
@@ -11093,19 +11093,19 @@
                   </a:txBody>
                   <a:tcPr>
                     <a:solidFill>
-                      <a:srgbClr val="4472C4"/>
-                    </a:solidFill>
-                  </a:tcPr>
-                </a:tc>
-                <a:tc>
-                  <a:txBody>
-                    <a:bodyPr/>
-                    <a:lstStyle/>
-                    <a:p>
-                      <a:pPr algn="l">
-                        <a:defRPr sz="900" b="1">
-                          <a:solidFill>
-                            <a:srgbClr val="FFFFFF"/>
+                      <a:srgbClr val="F5F5F5"/>
+                    </a:solidFill>
+                  </a:tcPr>
+                </a:tc>
+                <a:tc>
+                  <a:txBody>
+                    <a:bodyPr/>
+                    <a:lstStyle/>
+                    <a:p>
+                      <a:pPr algn="l">
+                        <a:defRPr sz="900">
+                          <a:solidFill>
+                            <a:srgbClr val="000000"/>
                           </a:solidFill>
                         </a:defRPr>
                       </a:pPr>
@@ -11116,27 +11116,27 @@
                   </a:txBody>
                   <a:tcPr>
                     <a:solidFill>
-                      <a:srgbClr val="4472C4"/>
-                    </a:solidFill>
-                  </a:tcPr>
-                </a:tc>
-                <a:tc>
-                  <a:txBody>
-                    <a:bodyPr/>
-                    <a:lstStyle/>
-                    <a:p>
-                      <a:pPr algn="l">
-                        <a:defRPr sz="900" b="1">
-                          <a:solidFill>
-                            <a:srgbClr val="FFFFFF"/>
-                          </a:solidFill>
-                        </a:defRPr>
-                      </a:pPr>
-                    </a:p>
-                  </a:txBody>
-                  <a:tcPr>
-                    <a:solidFill>
-                      <a:srgbClr val="4472C4"/>
+                      <a:srgbClr val="F5F5F5"/>
+                    </a:solidFill>
+                  </a:tcPr>
+                </a:tc>
+                <a:tc>
+                  <a:txBody>
+                    <a:bodyPr/>
+                    <a:lstStyle/>
+                    <a:p>
+                      <a:pPr algn="l">
+                        <a:defRPr sz="900">
+                          <a:solidFill>
+                            <a:srgbClr val="000000"/>
+                          </a:solidFill>
+                        </a:defRPr>
+                      </a:pPr>
+                    </a:p>
+                  </a:txBody>
+                  <a:tcPr>
+                    <a:solidFill>
+                      <a:srgbClr val="F5F5F5"/>
                     </a:solidFill>
                   </a:tcPr>
                 </a:tc>
@@ -11153,42 +11153,7 @@
         </p:nvSpPr>
         <p:spPr>
           <a:xfrm>
-            <a:off x="457200" y="3474719"/>
-            <a:ext cx="11277295" cy="182880"/>
-          </a:xfrm>
-          <a:prstGeom prst="rect">
-            <a:avLst/>
-          </a:prstGeom>
-          <a:noFill/>
-        </p:spPr>
-        <p:txBody>
-          <a:bodyPr wrap="none">
-            <a:spAutoFit/>
-          </a:bodyPr>
-          <a:lstStyle/>
-          <a:p>
-            <a:pPr>
-              <a:defRPr sz="800" i="1">
-                <a:solidFill>
-                  <a:srgbClr val="000000"/>
-                </a:solidFill>
-              </a:defRPr>
-            </a:pPr>
-            <a:r>
-              <a:t>**Remediation timeline based on severity and business impact</a:t>
-            </a:r>
-          </a:p>
-        </p:txBody>
-      </p:sp>
-      <p:sp>
-        <p:nvSpPr>
-          <p:cNvPr id="7" name="TextBox 6"/>
-          <p:cNvSpPr txBox="1"/>
-          <p:nvPr/>
-        </p:nvSpPr>
-        <p:spPr>
-          <a:xfrm>
-            <a:off x="457200" y="3749039"/>
+            <a:off x="457200" y="3474720"/>
             <a:ext cx="11277295" cy="274320"/>
           </a:xfrm>
           <a:prstGeom prst="rect">
@@ -11217,14 +11182,14 @@
       </p:sp>
       <p:graphicFrame>
         <p:nvGraphicFramePr>
-          <p:cNvPr id="8" name="Table 7"/>
+          <p:cNvPr id="7" name="Table 6"/>
           <p:cNvGraphicFramePr>
             <a:graphicFrameLocks noGrp="1"/>
           </p:cNvGraphicFramePr>
           <p:nvPr/>
         </p:nvGraphicFramePr>
         <p:xfrm>
-          <a:off x="457200" y="4114799"/>
+          <a:off x="457200" y="3840480"/>
           <a:ext cx="10332720" cy="1965960"/>
         </p:xfrm>
         <a:graphic>
@@ -11387,7 +11352,7 @@
                     <a:bodyPr/>
                     <a:lstStyle/>
                     <a:p>
-                      <a:pPr algn="l">
+                      <a:pPr>
                         <a:defRPr sz="900">
                           <a:solidFill>
                             <a:srgbClr val="000000"/>
@@ -11410,7 +11375,7 @@
                     <a:bodyPr/>
                     <a:lstStyle/>
                     <a:p>
-                      <a:pPr>
+                      <a:pPr algn="l">
                         <a:defRPr sz="900">
                           <a:solidFill>
                             <a:srgbClr val="000000"/>
@@ -11527,7 +11492,7 @@
                     <a:bodyPr/>
                     <a:lstStyle/>
                     <a:p>
-                      <a:pPr algn="l">
+                      <a:pPr>
                         <a:defRPr sz="900">
                           <a:solidFill>
                             <a:srgbClr val="000000"/>
@@ -11546,7 +11511,7 @@
                     <a:bodyPr/>
                     <a:lstStyle/>
                     <a:p>
-                      <a:pPr>
+                      <a:pPr algn="l">
                         <a:defRPr sz="900">
                           <a:solidFill>
                             <a:srgbClr val="000000"/>
@@ -11643,7 +11608,7 @@
                     <a:bodyPr/>
                     <a:lstStyle/>
                     <a:p>
-                      <a:pPr algn="l">
+                      <a:pPr>
                         <a:defRPr sz="900">
                           <a:solidFill>
                             <a:srgbClr val="000000"/>
@@ -11666,7 +11631,7 @@
                     <a:bodyPr/>
                     <a:lstStyle/>
                     <a:p>
-                      <a:pPr>
+                      <a:pPr algn="l">
                         <a:defRPr sz="900">
                           <a:solidFill>
                             <a:srgbClr val="000000"/>
@@ -11783,7 +11748,7 @@
                     <a:bodyPr/>
                     <a:lstStyle/>
                     <a:p>
-                      <a:pPr algn="l">
+                      <a:pPr>
                         <a:defRPr sz="900">
                           <a:solidFill>
                             <a:srgbClr val="000000"/>
@@ -11802,7 +11767,7 @@
                     <a:bodyPr/>
                     <a:lstStyle/>
                     <a:p>
-                      <a:pPr>
+                      <a:pPr algn="l">
                         <a:defRPr sz="900">
                           <a:solidFill>
                             <a:srgbClr val="000000"/>
@@ -11899,30 +11864,30 @@
                     <a:bodyPr/>
                     <a:lstStyle/>
                     <a:p>
-                      <a:pPr algn="l">
-                        <a:defRPr sz="900" b="1">
-                          <a:solidFill>
-                            <a:srgbClr val="FFFFFF"/>
-                          </a:solidFill>
-                        </a:defRPr>
-                      </a:pPr>
-                    </a:p>
-                  </a:txBody>
-                  <a:tcPr>
-                    <a:solidFill>
-                      <a:srgbClr val="4472C4"/>
-                    </a:solidFill>
-                  </a:tcPr>
-                </a:tc>
-                <a:tc>
-                  <a:txBody>
-                    <a:bodyPr/>
-                    <a:lstStyle/>
-                    <a:p>
                       <a:pPr>
-                        <a:defRPr sz="900" b="1">
-                          <a:solidFill>
-                            <a:srgbClr val="FFFFFF"/>
+                        <a:defRPr sz="900">
+                          <a:solidFill>
+                            <a:srgbClr val="000000"/>
+                          </a:solidFill>
+                        </a:defRPr>
+                      </a:pPr>
+                    </a:p>
+                  </a:txBody>
+                  <a:tcPr>
+                    <a:solidFill>
+                      <a:srgbClr val="F5F5F5"/>
+                    </a:solidFill>
+                  </a:tcPr>
+                </a:tc>
+                <a:tc>
+                  <a:txBody>
+                    <a:bodyPr/>
+                    <a:lstStyle/>
+                    <a:p>
+                      <a:pPr algn="l">
+                        <a:defRPr sz="900">
+                          <a:solidFill>
+                            <a:srgbClr val="000000"/>
                           </a:solidFill>
                         </a:defRPr>
                       </a:pPr>
@@ -11933,19 +11898,19 @@
                   </a:txBody>
                   <a:tcPr>
                     <a:solidFill>
-                      <a:srgbClr val="4472C4"/>
-                    </a:solidFill>
-                  </a:tcPr>
-                </a:tc>
-                <a:tc>
-                  <a:txBody>
-                    <a:bodyPr/>
-                    <a:lstStyle/>
-                    <a:p>
-                      <a:pPr algn="l">
-                        <a:defRPr sz="900" b="1">
-                          <a:solidFill>
-                            <a:srgbClr val="FFFFFF"/>
+                      <a:srgbClr val="F5F5F5"/>
+                    </a:solidFill>
+                  </a:tcPr>
+                </a:tc>
+                <a:tc>
+                  <a:txBody>
+                    <a:bodyPr/>
+                    <a:lstStyle/>
+                    <a:p>
+                      <a:pPr algn="l">
+                        <a:defRPr sz="900">
+                          <a:solidFill>
+                            <a:srgbClr val="000000"/>
                           </a:solidFill>
                         </a:defRPr>
                       </a:pPr>
@@ -11956,19 +11921,19 @@
                   </a:txBody>
                   <a:tcPr>
                     <a:solidFill>
-                      <a:srgbClr val="4472C4"/>
-                    </a:solidFill>
-                  </a:tcPr>
-                </a:tc>
-                <a:tc>
-                  <a:txBody>
-                    <a:bodyPr/>
-                    <a:lstStyle/>
-                    <a:p>
-                      <a:pPr algn="l">
-                        <a:defRPr sz="900" b="1">
-                          <a:solidFill>
-                            <a:srgbClr val="FFFFFF"/>
+                      <a:srgbClr val="F5F5F5"/>
+                    </a:solidFill>
+                  </a:tcPr>
+                </a:tc>
+                <a:tc>
+                  <a:txBody>
+                    <a:bodyPr/>
+                    <a:lstStyle/>
+                    <a:p>
+                      <a:pPr algn="l">
+                        <a:defRPr sz="900">
+                          <a:solidFill>
+                            <a:srgbClr val="000000"/>
                           </a:solidFill>
                         </a:defRPr>
                       </a:pPr>
@@ -11979,19 +11944,19 @@
                   </a:txBody>
                   <a:tcPr>
                     <a:solidFill>
-                      <a:srgbClr val="4472C4"/>
-                    </a:solidFill>
-                  </a:tcPr>
-                </a:tc>
-                <a:tc>
-                  <a:txBody>
-                    <a:bodyPr/>
-                    <a:lstStyle/>
-                    <a:p>
-                      <a:pPr algn="l">
-                        <a:defRPr sz="900" b="1">
-                          <a:solidFill>
-                            <a:srgbClr val="FFFFFF"/>
+                      <a:srgbClr val="F5F5F5"/>
+                    </a:solidFill>
+                  </a:tcPr>
+                </a:tc>
+                <a:tc>
+                  <a:txBody>
+                    <a:bodyPr/>
+                    <a:lstStyle/>
+                    <a:p>
+                      <a:pPr algn="l">
+                        <a:defRPr sz="900">
+                          <a:solidFill>
+                            <a:srgbClr val="000000"/>
                           </a:solidFill>
                         </a:defRPr>
                       </a:pPr>
@@ -12002,27 +11967,27 @@
                   </a:txBody>
                   <a:tcPr>
                     <a:solidFill>
-                      <a:srgbClr val="4472C4"/>
-                    </a:solidFill>
-                  </a:tcPr>
-                </a:tc>
-                <a:tc>
-                  <a:txBody>
-                    <a:bodyPr/>
-                    <a:lstStyle/>
-                    <a:p>
-                      <a:pPr algn="l">
-                        <a:defRPr sz="900" b="1">
-                          <a:solidFill>
-                            <a:srgbClr val="FFFFFF"/>
-                          </a:solidFill>
-                        </a:defRPr>
-                      </a:pPr>
-                    </a:p>
-                  </a:txBody>
-                  <a:tcPr>
-                    <a:solidFill>
-                      <a:srgbClr val="4472C4"/>
+                      <a:srgbClr val="F5F5F5"/>
+                    </a:solidFill>
+                  </a:tcPr>
+                </a:tc>
+                <a:tc>
+                  <a:txBody>
+                    <a:bodyPr/>
+                    <a:lstStyle/>
+                    <a:p>
+                      <a:pPr algn="l">
+                        <a:defRPr sz="900">
+                          <a:solidFill>
+                            <a:srgbClr val="000000"/>
+                          </a:solidFill>
+                        </a:defRPr>
+                      </a:pPr>
+                    </a:p>
+                  </a:txBody>
+                  <a:tcPr>
+                    <a:solidFill>
+                      <a:srgbClr val="F5F5F5"/>
                     </a:solidFill>
                   </a:tcPr>
                 </a:tc>
@@ -12031,6 +11996,41 @@
           </a:graphicData>
         </a:graphic>
       </p:graphicFrame>
+      <p:sp>
+        <p:nvSpPr>
+          <p:cNvPr id="8" name="TextBox 7"/>
+          <p:cNvSpPr txBox="1"/>
+          <p:nvPr/>
+        </p:nvSpPr>
+        <p:spPr>
+          <a:xfrm>
+            <a:off x="457200" y="6217920"/>
+            <a:ext cx="11277295" cy="182880"/>
+          </a:xfrm>
+          <a:prstGeom prst="rect">
+            <a:avLst/>
+          </a:prstGeom>
+          <a:noFill/>
+        </p:spPr>
+        <p:txBody>
+          <a:bodyPr wrap="none">
+            <a:spAutoFit/>
+          </a:bodyPr>
+          <a:lstStyle/>
+          <a:p>
+            <a:pPr>
+              <a:defRPr sz="800" i="1">
+                <a:solidFill>
+                  <a:srgbClr val="000000"/>
+                </a:solidFill>
+              </a:defRPr>
+            </a:pPr>
+            <a:r>
+              <a:t>**Remediation timeline based on severity and business impact</a:t>
+            </a:r>
+          </a:p>
+        </p:txBody>
+      </p:sp>
     </p:spTree>
   </p:cSld>
   <p:clrMapOvr>
@@ -13329,9 +13329,6 @@
                           </a:solidFill>
                         </a:defRPr>
                       </a:pPr>
-                      <a:r>
-                        <a:t>0</a:t>
-                      </a:r>
                     </a:p>
                   </a:txBody>
                   <a:tcPr>
@@ -13352,9 +13349,6 @@
                           </a:solidFill>
                         </a:defRPr>
                       </a:pPr>
-                      <a:r>
-                        <a:t>0</a:t>
-                      </a:r>
                     </a:p>
                   </a:txBody>
                   <a:tcPr>
@@ -15488,9 +15482,6 @@
                           </a:solidFill>
                         </a:defRPr>
                       </a:pPr>
-                      <a:r>
-                        <a:t>0</a:t>
-                      </a:r>
                     </a:p>
                   </a:txBody>
                   <a:tcPr>
@@ -15511,9 +15502,6 @@
                           </a:solidFill>
                         </a:defRPr>
                       </a:pPr>
-                      <a:r>
-                        <a:t>0</a:t>
-                      </a:r>
                     </a:p>
                   </a:txBody>
                   <a:tcPr>
@@ -15557,9 +15545,6 @@
                           </a:solidFill>
                         </a:defRPr>
                       </a:pPr>
-                      <a:r>
-                        <a:t>0</a:t>
-                      </a:r>
                     </a:p>
                   </a:txBody>
                   <a:tcPr>
@@ -15722,6 +15707,230 @@
                     <a:bodyPr/>
                     <a:lstStyle/>
                     <a:p>
+                      <a:pPr algn="l">
+                        <a:defRPr b="1" sz="1100">
+                          <a:solidFill>
+                            <a:srgbClr val="FFFFFF"/>
+                          </a:solidFill>
+                        </a:defRPr>
+                      </a:pPr>
+                      <a:r>
+                        <a:t>EOL</a:t>
+                      </a:r>
+                    </a:p>
+                  </a:txBody>
+                  <a:tcPr>
+                    <a:solidFill>
+                      <a:srgbClr val="4472C4"/>
+                    </a:solidFill>
+                  </a:tcPr>
+                </a:tc>
+                <a:tc>
+                  <a:txBody>
+                    <a:bodyPr/>
+                    <a:lstStyle/>
+                    <a:p>
+                      <a:pPr algn="l">
+                        <a:defRPr b="1" sz="1100">
+                          <a:solidFill>
+                            <a:srgbClr val="FFFFFF"/>
+                          </a:solidFill>
+                        </a:defRPr>
+                      </a:pPr>
+                      <a:r>
+                        <a:t>Immediate</a:t>
+                      </a:r>
+                    </a:p>
+                  </a:txBody>
+                  <a:tcPr>
+                    <a:solidFill>
+                      <a:srgbClr val="4472C4"/>
+                    </a:solidFill>
+                  </a:tcPr>
+                </a:tc>
+              </a:tr>
+              <a:tr h="320040">
+                <a:tc>
+                  <a:txBody>
+                    <a:bodyPr/>
+                    <a:lstStyle/>
+                    <a:p>
+                      <a:pPr>
+                        <a:defRPr sz="900">
+                          <a:solidFill>
+                            <a:srgbClr val="000000"/>
+                          </a:solidFill>
+                        </a:defRPr>
+                      </a:pPr>
+                      <a:r>
+                        <a:t>SSL/TLS Issues</a:t>
+                      </a:r>
+                    </a:p>
+                  </a:txBody>
+                  <a:tcPr>
+                    <a:solidFill>
+                      <a:srgbClr val="F5F5F5"/>
+                    </a:solidFill>
+                  </a:tcPr>
+                </a:tc>
+                <a:tc>
+                  <a:txBody>
+                    <a:bodyPr/>
+                    <a:lstStyle/>
+                    <a:p>
+                      <a:pPr algn="l">
+                        <a:defRPr sz="900">
+                          <a:solidFill>
+                            <a:srgbClr val="000000"/>
+                          </a:solidFill>
+                        </a:defRPr>
+                      </a:pPr>
+                      <a:r>
+                        <a:t>7</a:t>
+                      </a:r>
+                    </a:p>
+                  </a:txBody>
+                  <a:tcPr>
+                    <a:solidFill>
+                      <a:srgbClr val="F5F5F5"/>
+                    </a:solidFill>
+                  </a:tcPr>
+                </a:tc>
+              </a:tr>
+              <a:tr h="320040">
+                <a:tc>
+                  <a:txBody>
+                    <a:bodyPr/>
+                    <a:lstStyle/>
+                    <a:p>
+                      <a:pPr>
+                        <a:defRPr sz="900">
+                          <a:solidFill>
+                            <a:srgbClr val="000000"/>
+                          </a:solidFill>
+                        </a:defRPr>
+                      </a:pPr>
+                      <a:r>
+                        <a:t>SSH Configuration</a:t>
+                      </a:r>
+                    </a:p>
+                  </a:txBody>
+                  <a:tcPr/>
+                </a:tc>
+                <a:tc>
+                  <a:txBody>
+                    <a:bodyPr/>
+                    <a:lstStyle/>
+                    <a:p>
+                      <a:pPr algn="l">
+                        <a:defRPr sz="900">
+                          <a:solidFill>
+                            <a:srgbClr val="000000"/>
+                          </a:solidFill>
+                        </a:defRPr>
+                      </a:pPr>
+                      <a:r>
+                        <a:t>7</a:t>
+                      </a:r>
+                    </a:p>
+                  </a:txBody>
+                  <a:tcPr/>
+                </a:tc>
+              </a:tr>
+              <a:tr h="320040">
+                <a:tc>
+                  <a:txBody>
+                    <a:bodyPr/>
+                    <a:lstStyle/>
+                    <a:p>
+                      <a:pPr>
+                        <a:defRPr sz="900">
+                          <a:solidFill>
+                            <a:srgbClr val="000000"/>
+                          </a:solidFill>
+                        </a:defRPr>
+                      </a:pPr>
+                      <a:r>
+                        <a:t>OS Vulnerabilities</a:t>
+                      </a:r>
+                    </a:p>
+                  </a:txBody>
+                  <a:tcPr>
+                    <a:solidFill>
+                      <a:srgbClr val="F5F5F5"/>
+                    </a:solidFill>
+                  </a:tcPr>
+                </a:tc>
+                <a:tc>
+                  <a:txBody>
+                    <a:bodyPr/>
+                    <a:lstStyle/>
+                    <a:p>
+                      <a:pPr algn="l">
+                        <a:defRPr sz="900">
+                          <a:solidFill>
+                            <a:srgbClr val="000000"/>
+                          </a:solidFill>
+                        </a:defRPr>
+                      </a:pPr>
+                      <a:r>
+                        <a:t>4</a:t>
+                      </a:r>
+                    </a:p>
+                  </a:txBody>
+                  <a:tcPr>
+                    <a:solidFill>
+                      <a:srgbClr val="F5F5F5"/>
+                    </a:solidFill>
+                  </a:tcPr>
+                </a:tc>
+              </a:tr>
+              <a:tr h="320040">
+                <a:tc>
+                  <a:txBody>
+                    <a:bodyPr/>
+                    <a:lstStyle/>
+                    <a:p>
+                      <a:pPr>
+                        <a:defRPr sz="900">
+                          <a:solidFill>
+                            <a:srgbClr val="000000"/>
+                          </a:solidFill>
+                        </a:defRPr>
+                      </a:pPr>
+                      <a:r>
+                        <a:t>Web Server Issues</a:t>
+                      </a:r>
+                    </a:p>
+                  </a:txBody>
+                  <a:tcPr/>
+                </a:tc>
+                <a:tc>
+                  <a:txBody>
+                    <a:bodyPr/>
+                    <a:lstStyle/>
+                    <a:p>
+                      <a:pPr algn="l">
+                        <a:defRPr sz="900">
+                          <a:solidFill>
+                            <a:srgbClr val="000000"/>
+                          </a:solidFill>
+                        </a:defRPr>
+                      </a:pPr>
+                      <a:r>
+                        <a:t>5</a:t>
+                      </a:r>
+                    </a:p>
+                  </a:txBody>
+                  <a:tcPr/>
+                </a:tc>
+              </a:tr>
+              <a:tr h="320040">
+                <a:tc>
+                  <a:txBody>
+                    <a:bodyPr/>
+                    <a:lstStyle/>
+                    <a:p>
                       <a:pPr>
                         <a:defRPr b="1" sz="900">
                           <a:solidFill>
@@ -15730,7 +15939,7 @@
                         </a:defRPr>
                       </a:pPr>
                       <a:r>
-                        <a:t>EOL</a:t>
+                        <a:t>Part 1 Total</a:t>
                       </a:r>
                     </a:p>
                   </a:txBody>
@@ -15745,232 +15954,8 @@
                     <a:bodyPr/>
                     <a:lstStyle/>
                     <a:p>
-                      <a:pPr>
+                      <a:pPr algn="l">
                         <a:defRPr b="1" sz="900">
-                          <a:solidFill>
-                            <a:srgbClr val="FFFFFF"/>
-                          </a:solidFill>
-                        </a:defRPr>
-                      </a:pPr>
-                      <a:r>
-                        <a:t>Immediate</a:t>
-                      </a:r>
-                    </a:p>
-                  </a:txBody>
-                  <a:tcPr>
-                    <a:solidFill>
-                      <a:srgbClr val="4472C4"/>
-                    </a:solidFill>
-                  </a:tcPr>
-                </a:tc>
-              </a:tr>
-              <a:tr h="320040">
-                <a:tc>
-                  <a:txBody>
-                    <a:bodyPr/>
-                    <a:lstStyle/>
-                    <a:p>
-                      <a:pPr>
-                        <a:defRPr sz="900">
-                          <a:solidFill>
-                            <a:srgbClr val="000000"/>
-                          </a:solidFill>
-                        </a:defRPr>
-                      </a:pPr>
-                      <a:r>
-                        <a:t>SSL/TLS Issues</a:t>
-                      </a:r>
-                    </a:p>
-                  </a:txBody>
-                  <a:tcPr>
-                    <a:solidFill>
-                      <a:srgbClr val="F5F5F5"/>
-                    </a:solidFill>
-                  </a:tcPr>
-                </a:tc>
-                <a:tc>
-                  <a:txBody>
-                    <a:bodyPr/>
-                    <a:lstStyle/>
-                    <a:p>
-                      <a:pPr algn="l">
-                        <a:defRPr sz="900">
-                          <a:solidFill>
-                            <a:srgbClr val="000000"/>
-                          </a:solidFill>
-                        </a:defRPr>
-                      </a:pPr>
-                      <a:r>
-                        <a:t>7</a:t>
-                      </a:r>
-                    </a:p>
-                  </a:txBody>
-                  <a:tcPr>
-                    <a:solidFill>
-                      <a:srgbClr val="F5F5F5"/>
-                    </a:solidFill>
-                  </a:tcPr>
-                </a:tc>
-              </a:tr>
-              <a:tr h="320040">
-                <a:tc>
-                  <a:txBody>
-                    <a:bodyPr/>
-                    <a:lstStyle/>
-                    <a:p>
-                      <a:pPr>
-                        <a:defRPr sz="900">
-                          <a:solidFill>
-                            <a:srgbClr val="000000"/>
-                          </a:solidFill>
-                        </a:defRPr>
-                      </a:pPr>
-                      <a:r>
-                        <a:t>SSH Configuration</a:t>
-                      </a:r>
-                    </a:p>
-                  </a:txBody>
-                  <a:tcPr/>
-                </a:tc>
-                <a:tc>
-                  <a:txBody>
-                    <a:bodyPr/>
-                    <a:lstStyle/>
-                    <a:p>
-                      <a:pPr algn="l">
-                        <a:defRPr sz="900">
-                          <a:solidFill>
-                            <a:srgbClr val="000000"/>
-                          </a:solidFill>
-                        </a:defRPr>
-                      </a:pPr>
-                      <a:r>
-                        <a:t>7</a:t>
-                      </a:r>
-                    </a:p>
-                  </a:txBody>
-                  <a:tcPr/>
-                </a:tc>
-              </a:tr>
-              <a:tr h="320040">
-                <a:tc>
-                  <a:txBody>
-                    <a:bodyPr/>
-                    <a:lstStyle/>
-                    <a:p>
-                      <a:pPr>
-                        <a:defRPr sz="900">
-                          <a:solidFill>
-                            <a:srgbClr val="000000"/>
-                          </a:solidFill>
-                        </a:defRPr>
-                      </a:pPr>
-                      <a:r>
-                        <a:t>OS Vulnerabilities</a:t>
-                      </a:r>
-                    </a:p>
-                  </a:txBody>
-                  <a:tcPr>
-                    <a:solidFill>
-                      <a:srgbClr val="F5F5F5"/>
-                    </a:solidFill>
-                  </a:tcPr>
-                </a:tc>
-                <a:tc>
-                  <a:txBody>
-                    <a:bodyPr/>
-                    <a:lstStyle/>
-                    <a:p>
-                      <a:pPr algn="l">
-                        <a:defRPr sz="900">
-                          <a:solidFill>
-                            <a:srgbClr val="000000"/>
-                          </a:solidFill>
-                        </a:defRPr>
-                      </a:pPr>
-                      <a:r>
-                        <a:t>4</a:t>
-                      </a:r>
-                    </a:p>
-                  </a:txBody>
-                  <a:tcPr>
-                    <a:solidFill>
-                      <a:srgbClr val="F5F5F5"/>
-                    </a:solidFill>
-                  </a:tcPr>
-                </a:tc>
-              </a:tr>
-              <a:tr h="320040">
-                <a:tc>
-                  <a:txBody>
-                    <a:bodyPr/>
-                    <a:lstStyle/>
-                    <a:p>
-                      <a:pPr>
-                        <a:defRPr sz="900">
-                          <a:solidFill>
-                            <a:srgbClr val="000000"/>
-                          </a:solidFill>
-                        </a:defRPr>
-                      </a:pPr>
-                      <a:r>
-                        <a:t>Web Server Issues</a:t>
-                      </a:r>
-                    </a:p>
-                  </a:txBody>
-                  <a:tcPr/>
-                </a:tc>
-                <a:tc>
-                  <a:txBody>
-                    <a:bodyPr/>
-                    <a:lstStyle/>
-                    <a:p>
-                      <a:pPr algn="l">
-                        <a:defRPr sz="900">
-                          <a:solidFill>
-                            <a:srgbClr val="000000"/>
-                          </a:solidFill>
-                        </a:defRPr>
-                      </a:pPr>
-                      <a:r>
-                        <a:t>5</a:t>
-                      </a:r>
-                    </a:p>
-                  </a:txBody>
-                  <a:tcPr/>
-                </a:tc>
-              </a:tr>
-              <a:tr h="320040">
-                <a:tc>
-                  <a:txBody>
-                    <a:bodyPr/>
-                    <a:lstStyle/>
-                    <a:p>
-                      <a:pPr>
-                        <a:defRPr sz="900" b="1">
-                          <a:solidFill>
-                            <a:srgbClr val="FFFFFF"/>
-                          </a:solidFill>
-                        </a:defRPr>
-                      </a:pPr>
-                      <a:r>
-                        <a:t>Part 1 Total</a:t>
-                      </a:r>
-                    </a:p>
-                  </a:txBody>
-                  <a:tcPr>
-                    <a:solidFill>
-                      <a:srgbClr val="4472C4"/>
-                    </a:solidFill>
-                  </a:tcPr>
-                </a:tc>
-                <a:tc>
-                  <a:txBody>
-                    <a:bodyPr/>
-                    <a:lstStyle/>
-                    <a:p>
-                      <a:pPr algn="l">
-                        <a:defRPr sz="900" b="1">
                           <a:solidFill>
                             <a:srgbClr val="FFFFFF"/>
                           </a:solidFill>
@@ -16020,6 +16005,102 @@
                     <a:bodyPr/>
                     <a:lstStyle/>
                     <a:p>
+                      <a:pPr algn="l">
+                        <a:defRPr b="1" sz="1100">
+                          <a:solidFill>
+                            <a:srgbClr val="FFFFFF"/>
+                          </a:solidFill>
+                        </a:defRPr>
+                      </a:pPr>
+                      <a:r>
+                        <a:t>EOL</a:t>
+                      </a:r>
+                    </a:p>
+                  </a:txBody>
+                  <a:tcPr>
+                    <a:solidFill>
+                      <a:srgbClr val="4472C4"/>
+                    </a:solidFill>
+                  </a:tcPr>
+                </a:tc>
+                <a:tc>
+                  <a:txBody>
+                    <a:bodyPr/>
+                    <a:lstStyle/>
+                    <a:p>
+                      <a:pPr algn="l">
+                        <a:defRPr b="1" sz="1100">
+                          <a:solidFill>
+                            <a:srgbClr val="FFFFFF"/>
+                          </a:solidFill>
+                        </a:defRPr>
+                      </a:pPr>
+                      <a:r>
+                        <a:t>Immediate</a:t>
+                      </a:r>
+                    </a:p>
+                  </a:txBody>
+                  <a:tcPr>
+                    <a:solidFill>
+                      <a:srgbClr val="4472C4"/>
+                    </a:solidFill>
+                  </a:tcPr>
+                </a:tc>
+              </a:tr>
+              <a:tr h="320040">
+                <a:tc>
+                  <a:txBody>
+                    <a:bodyPr/>
+                    <a:lstStyle/>
+                    <a:p>
+                      <a:pPr>
+                        <a:defRPr sz="900">
+                          <a:solidFill>
+                            <a:srgbClr val="000000"/>
+                          </a:solidFill>
+                        </a:defRPr>
+                      </a:pPr>
+                      <a:r>
+                        <a:t>Yash_Internal</a:t>
+                      </a:r>
+                    </a:p>
+                  </a:txBody>
+                  <a:tcPr>
+                    <a:solidFill>
+                      <a:srgbClr val="F5F5F5"/>
+                    </a:solidFill>
+                  </a:tcPr>
+                </a:tc>
+                <a:tc>
+                  <a:txBody>
+                    <a:bodyPr/>
+                    <a:lstStyle/>
+                    <a:p>
+                      <a:pPr algn="l">
+                        <a:defRPr sz="900">
+                          <a:solidFill>
+                            <a:srgbClr val="000000"/>
+                          </a:solidFill>
+                        </a:defRPr>
+                      </a:pPr>
+                      <a:r>
+                        <a:t>5</a:t>
+                      </a:r>
+                    </a:p>
+                  </a:txBody>
+                  <a:tcPr>
+                    <a:solidFill>
+                      <a:srgbClr val="F5F5F5"/>
+                    </a:solidFill>
+                  </a:tcPr>
+                </a:tc>
+              </a:tr>
+              <a:tr h="320040">
+                <a:tc>
+                  <a:txBody>
+                    <a:bodyPr/>
+                    <a:lstStyle/>
+                    <a:p>
                       <a:pPr>
                         <a:defRPr b="1" sz="900">
                           <a:solidFill>
@@ -16028,7 +16109,7 @@
                         </a:defRPr>
                       </a:pPr>
                       <a:r>
-                        <a:t>EOL</a:t>
+                        <a:t>Part 2 Total</a:t>
                       </a:r>
                     </a:p>
                   </a:txBody>
@@ -16043,104 +16124,8 @@
                     <a:bodyPr/>
                     <a:lstStyle/>
                     <a:p>
-                      <a:pPr>
+                      <a:pPr algn="l">
                         <a:defRPr b="1" sz="900">
-                          <a:solidFill>
-                            <a:srgbClr val="FFFFFF"/>
-                          </a:solidFill>
-                        </a:defRPr>
-                      </a:pPr>
-                      <a:r>
-                        <a:t>Immediate</a:t>
-                      </a:r>
-                    </a:p>
-                  </a:txBody>
-                  <a:tcPr>
-                    <a:solidFill>
-                      <a:srgbClr val="4472C4"/>
-                    </a:solidFill>
-                  </a:tcPr>
-                </a:tc>
-              </a:tr>
-              <a:tr h="320040">
-                <a:tc>
-                  <a:txBody>
-                    <a:bodyPr/>
-                    <a:lstStyle/>
-                    <a:p>
-                      <a:pPr>
-                        <a:defRPr sz="900">
-                          <a:solidFill>
-                            <a:srgbClr val="000000"/>
-                          </a:solidFill>
-                        </a:defRPr>
-                      </a:pPr>
-                      <a:r>
-                        <a:t>Yash_Internal</a:t>
-                      </a:r>
-                    </a:p>
-                  </a:txBody>
-                  <a:tcPr>
-                    <a:solidFill>
-                      <a:srgbClr val="F5F5F5"/>
-                    </a:solidFill>
-                  </a:tcPr>
-                </a:tc>
-                <a:tc>
-                  <a:txBody>
-                    <a:bodyPr/>
-                    <a:lstStyle/>
-                    <a:p>
-                      <a:pPr algn="l">
-                        <a:defRPr sz="900">
-                          <a:solidFill>
-                            <a:srgbClr val="000000"/>
-                          </a:solidFill>
-                        </a:defRPr>
-                      </a:pPr>
-                      <a:r>
-                        <a:t>5</a:t>
-                      </a:r>
-                    </a:p>
-                  </a:txBody>
-                  <a:tcPr>
-                    <a:solidFill>
-                      <a:srgbClr val="F5F5F5"/>
-                    </a:solidFill>
-                  </a:tcPr>
-                </a:tc>
-              </a:tr>
-              <a:tr h="320040">
-                <a:tc>
-                  <a:txBody>
-                    <a:bodyPr/>
-                    <a:lstStyle/>
-                    <a:p>
-                      <a:pPr>
-                        <a:defRPr sz="900" b="1">
-                          <a:solidFill>
-                            <a:srgbClr val="FFFFFF"/>
-                          </a:solidFill>
-                        </a:defRPr>
-                      </a:pPr>
-                      <a:r>
-                        <a:t>Part 2 Total</a:t>
-                      </a:r>
-                    </a:p>
-                  </a:txBody>
-                  <a:tcPr>
-                    <a:solidFill>
-                      <a:srgbClr val="4472C4"/>
-                    </a:solidFill>
-                  </a:tcPr>
-                </a:tc>
-                <a:tc>
-                  <a:txBody>
-                    <a:bodyPr/>
-                    <a:lstStyle/>
-                    <a:p>
-                      <a:pPr algn="l">
-                        <a:defRPr sz="900" b="1">
                           <a:solidFill>
                             <a:srgbClr val="FFFFFF"/>
                           </a:solidFill>
@@ -16171,7 +16156,7 @@
           <p:nvPr/>
         </p:nvGraphicFramePr>
         <p:xfrm>
-          <a:off x="274320" y="3474719"/>
+          <a:off x="274320" y="5303520"/>
           <a:ext cx="4572000" cy="1325880"/>
         </p:xfrm>
         <a:graphic>
@@ -16190,14 +16175,8 @@
                     <a:bodyPr/>
                     <a:lstStyle/>
                     <a:p>
-                      <a:pPr>
-                        <a:spcBef>
-                          <a:spcPts val="0"/>
-                        </a:spcBef>
-                        <a:spcAft>
-                          <a:spcPts val="0"/>
-                        </a:spcAft>
-                        <a:defRPr b="1" sz="900">
+                      <a:pPr algn="l">
+                        <a:defRPr b="1" sz="1100">
                           <a:solidFill>
                             <a:srgbClr val="FFFFFF"/>
                           </a:solidFill>
@@ -16219,14 +16198,8 @@
                     <a:bodyPr/>
                     <a:lstStyle/>
                     <a:p>
-                      <a:pPr>
-                        <a:spcBef>
-                          <a:spcPts val="0"/>
-                        </a:spcBef>
-                        <a:spcAft>
-                          <a:spcPts val="0"/>
-                        </a:spcAft>
-                        <a:defRPr b="1" sz="900">
+                      <a:pPr algn="l">
+                        <a:defRPr b="1" sz="1100">
                           <a:solidFill>
                             <a:srgbClr val="FFFFFF"/>
                           </a:solidFill>
@@ -16251,12 +16224,6 @@
                     <a:lstStyle/>
                     <a:p>
                       <a:pPr>
-                        <a:spcBef>
-                          <a:spcPts val="0"/>
-                        </a:spcBef>
-                        <a:spcAft>
-                          <a:spcPts val="0"/>
-                        </a:spcAft>
                         <a:defRPr b="0" sz="900">
                           <a:solidFill>
                             <a:srgbClr val="000000"/>
@@ -16280,12 +16247,6 @@
                     <a:lstStyle/>
                     <a:p>
                       <a:pPr algn="l">
-                        <a:spcBef>
-                          <a:spcPts val="0"/>
-                        </a:spcBef>
-                        <a:spcAft>
-                          <a:spcPts val="0"/>
-                        </a:spcAft>
                         <a:defRPr b="0" sz="900">
                           <a:solidFill>
                             <a:srgbClr val="000000"/>
@@ -16311,12 +16272,6 @@
                     <a:lstStyle/>
                     <a:p>
                       <a:pPr>
-                        <a:spcBef>
-                          <a:spcPts val="0"/>
-                        </a:spcBef>
-                        <a:spcAft>
-                          <a:spcPts val="0"/>
-                        </a:spcAft>
                         <a:defRPr b="0" sz="900">
                           <a:solidFill>
                             <a:srgbClr val="000000"/>
@@ -16340,12 +16295,6 @@
                     <a:lstStyle/>
                     <a:p>
                       <a:pPr algn="l">
-                        <a:spcBef>
-                          <a:spcPts val="0"/>
-                        </a:spcBef>
-                        <a:spcAft>
-                          <a:spcPts val="0"/>
-                        </a:spcAft>
                         <a:defRPr b="0" sz="900">
                           <a:solidFill>
                             <a:srgbClr val="000000"/>
@@ -16371,12 +16320,6 @@
                     <a:lstStyle/>
                     <a:p>
                       <a:pPr>
-                        <a:spcBef>
-                          <a:spcPts val="0"/>
-                        </a:spcBef>
-                        <a:spcAft>
-                          <a:spcPts val="0"/>
-                        </a:spcAft>
                         <a:defRPr b="1" sz="900">
                           <a:solidFill>
                             <a:srgbClr val="FFFFFF"/>
@@ -16400,12 +16343,6 @@
                     <a:lstStyle/>
                     <a:p>
                       <a:pPr algn="l">
-                        <a:spcBef>
-                          <a:spcPts val="0"/>
-                        </a:spcBef>
-                        <a:spcAft>
-                          <a:spcPts val="0"/>
-                        </a:spcAft>
                         <a:defRPr b="1" sz="900">
                           <a:solidFill>
                             <a:srgbClr val="FFFFFF"/>

</xml_diff>